<commit_message>
ali ali eta uta garako
</commit_message>
<xml_diff>
--- a/B_Tree.pptx
+++ b/B_Tree.pptx
@@ -6,17 +6,19 @@
     <p:sldMasterId id="2147483650" r:id="rId2"/>
   </p:sldMasterIdLst>
   <p:notesMasterIdLst>
-    <p:notesMasterId r:id="rId8"/>
+    <p:notesMasterId r:id="rId10"/>
   </p:notesMasterIdLst>
   <p:handoutMasterIdLst>
-    <p:handoutMasterId r:id="rId9"/>
+    <p:handoutMasterId r:id="rId11"/>
   </p:handoutMasterIdLst>
   <p:sldIdLst>
     <p:sldId id="256" r:id="rId3"/>
-    <p:sldId id="257" r:id="rId4"/>
-    <p:sldId id="259" r:id="rId5"/>
-    <p:sldId id="260" r:id="rId6"/>
-    <p:sldId id="261" r:id="rId7"/>
+    <p:sldId id="263" r:id="rId4"/>
+    <p:sldId id="257" r:id="rId5"/>
+    <p:sldId id="259" r:id="rId6"/>
+    <p:sldId id="260" r:id="rId7"/>
+    <p:sldId id="262" r:id="rId8"/>
+    <p:sldId id="261" r:id="rId9"/>
   </p:sldIdLst>
   <p:sldSz cx="9144000" cy="6858000" type="screen4x3"/>
   <p:notesSz cx="6858000" cy="9144000"/>
@@ -7116,8 +7118,12 @@
           <a:lstStyle/>
           <a:p>
             <a:r>
+              <a:rPr lang="en-US" altLang="en-US" smtClean="0"/>
+              <a:t>B </a:t>
+            </a:r>
+            <a:r>
               <a:rPr lang="en-US" altLang="en-US" dirty="0" smtClean="0"/>
-              <a:t>BT Tree</a:t>
+              <a:t>Tree</a:t>
             </a:r>
             <a:endParaRPr lang="en-US" altLang="en-US" dirty="0"/>
           </a:p>
@@ -7193,12 +7199,12 @@
       </p:grpSpPr>
       <p:sp>
         <p:nvSpPr>
-          <p:cNvPr id="6" name="Slide Number Placeholder 5"/>
-          <p:cNvSpPr>
-            <a:spLocks noGrp="1"/>
-          </p:cNvSpPr>
-          <p:nvPr>
-            <p:ph type="sldNum" sz="quarter" idx="12"/>
+          <p:cNvPr id="2" name="Title 1"/>
+          <p:cNvSpPr>
+            <a:spLocks noGrp="1"/>
+          </p:cNvSpPr>
+          <p:nvPr>
+            <p:ph type="title"/>
           </p:nvPr>
         </p:nvSpPr>
         <p:spPr/>
@@ -7206,8 +7212,31 @@
           <a:bodyPr/>
           <a:lstStyle/>
           <a:p>
-            <a:fld id="{C49A274E-CC01-4F38-A825-231E9BD0B7CE}" type="slidenum">
-              <a:rPr lang="ru-RU" altLang="en-US"/>
+            <a:r>
+              <a:rPr lang="en-US" altLang="en-US" dirty="0"/>
+              <a:t>Properties of B-Tree</a:t>
+            </a:r>
+            <a:endParaRPr lang="en-US" dirty="0"/>
+          </a:p>
+        </p:txBody>
+      </p:sp>
+      <p:sp>
+        <p:nvSpPr>
+          <p:cNvPr id="4" name="Slide Number Placeholder 3"/>
+          <p:cNvSpPr>
+            <a:spLocks noGrp="1"/>
+          </p:cNvSpPr>
+          <p:nvPr>
+            <p:ph type="sldNum" sz="quarter" idx="12"/>
+          </p:nvPr>
+        </p:nvSpPr>
+        <p:spPr/>
+        <p:txBody>
+          <a:bodyPr/>
+          <a:lstStyle/>
+          <a:p>
+            <a:fld id="{18DF9502-6D5B-41C7-9C84-101A6FEAD223}" type="slidenum">
+              <a:rPr lang="ru-RU" altLang="en-US" smtClean="0"/>
               <a:pPr/>
               <a:t>2</a:t>
             </a:fld>
@@ -7217,211 +7246,1219 @@
       </p:sp>
       <p:sp>
         <p:nvSpPr>
-          <p:cNvPr id="36866" name="Rectangle 2"/>
-          <p:cNvSpPr>
-            <a:spLocks noGrp="1" noChangeArrowheads="1"/>
-          </p:cNvSpPr>
-          <p:nvPr>
-            <p:ph type="title"/>
-          </p:nvPr>
+          <p:cNvPr id="6" name="Rectangle 5"/>
+          <p:cNvSpPr/>
+          <p:nvPr/>
+        </p:nvSpPr>
+        <p:spPr bwMode="auto">
+          <a:xfrm>
+            <a:off x="2209800" y="1752600"/>
+            <a:ext cx="2590800" cy="685800"/>
+          </a:xfrm>
+          <a:prstGeom prst="rect">
+            <a:avLst/>
+          </a:prstGeom>
+          <a:solidFill>
+            <a:schemeClr val="bg1"/>
+          </a:solidFill>
+          <a:ln w="9525" cap="flat" cmpd="sng" algn="ctr">
+            <a:solidFill>
+              <a:schemeClr val="tx1"/>
+            </a:solidFill>
+            <a:prstDash val="solid"/>
+            <a:round/>
+            <a:headEnd type="none" w="med" len="med"/>
+            <a:tailEnd type="none" w="med" len="med"/>
+          </a:ln>
+          <a:effectLst/>
+          <a:extLst/>
+        </p:spPr>
+        <p:txBody>
+          <a:bodyPr vert="horz" wrap="square" lIns="91440" tIns="45720" rIns="91440" bIns="45720" numCol="1" rtlCol="0" anchor="t" anchorCtr="0" compatLnSpc="1">
+            <a:prstTxWarp prst="textNoShape">
+              <a:avLst/>
+            </a:prstTxWarp>
+          </a:bodyPr>
+          <a:lstStyle/>
+          <a:p>
+            <a:pPr marL="0" marR="0" indent="0" algn="l" defTabSz="914400" rtl="0" eaLnBrk="1" fontAlgn="base" latinLnBrk="0" hangingPunct="1">
+              <a:lnSpc>
+                <a:spcPct val="100000"/>
+              </a:lnSpc>
+              <a:spcBef>
+                <a:spcPct val="0"/>
+              </a:spcBef>
+              <a:spcAft>
+                <a:spcPct val="0"/>
+              </a:spcAft>
+              <a:buClrTx/>
+              <a:buSzTx/>
+              <a:buFontTx/>
+              <a:buNone/>
+              <a:tabLst/>
+            </a:pPr>
+            <a:endParaRPr kumimoji="0" lang="en-US" sz="3600" b="0" i="0" u="none" strike="noStrike" cap="none" normalizeH="0" baseline="0" smtClean="0">
+              <a:ln>
+                <a:noFill/>
+              </a:ln>
+              <a:solidFill>
+                <a:schemeClr val="tx2"/>
+              </a:solidFill>
+              <a:effectLst/>
+              <a:latin typeface="Futura LT Book" pitchFamily="2" charset="0"/>
+              <a:ea typeface="굴림" pitchFamily="34" charset="-127"/>
+            </a:endParaRPr>
+          </a:p>
+        </p:txBody>
+      </p:sp>
+      <p:cxnSp>
+        <p:nvCxnSpPr>
+          <p:cNvPr id="8" name="Straight Connector 7"/>
+          <p:cNvCxnSpPr/>
+          <p:nvPr/>
+        </p:nvCxnSpPr>
+        <p:spPr bwMode="auto">
+          <a:xfrm>
+            <a:off x="3059113" y="1752600"/>
+            <a:ext cx="0" cy="685800"/>
+          </a:xfrm>
+          <a:prstGeom prst="line">
+            <a:avLst/>
+          </a:prstGeom>
+          <a:solidFill>
+            <a:schemeClr val="accent1"/>
+          </a:solidFill>
+          <a:ln w="9525" cap="flat" cmpd="sng" algn="ctr">
+            <a:solidFill>
+              <a:schemeClr val="tx1"/>
+            </a:solidFill>
+            <a:prstDash val="solid"/>
+            <a:round/>
+            <a:headEnd type="none" w="med" len="med"/>
+            <a:tailEnd type="none" w="med" len="med"/>
+          </a:ln>
+          <a:effectLst/>
+          <a:extLst>
+            <a:ext uri="{AF507438-7753-43E0-B8FC-AC1667EBCBE1}">
+              <a14:hiddenEffects xmlns:a14="http://schemas.microsoft.com/office/drawing/2010/main">
+                <a:effectLst>
+                  <a:outerShdw dist="35921" dir="2700000" algn="ctr" rotWithShape="0">
+                    <a:schemeClr val="bg2"/>
+                  </a:outerShdw>
+                </a:effectLst>
+              </a14:hiddenEffects>
+            </a:ext>
+          </a:extLst>
+        </p:spPr>
+      </p:cxnSp>
+      <p:cxnSp>
+        <p:nvCxnSpPr>
+          <p:cNvPr id="10" name="Straight Connector 9"/>
+          <p:cNvCxnSpPr/>
+          <p:nvPr/>
+        </p:nvCxnSpPr>
+        <p:spPr bwMode="auto">
+          <a:xfrm>
+            <a:off x="3962400" y="1752600"/>
+            <a:ext cx="0" cy="685800"/>
+          </a:xfrm>
+          <a:prstGeom prst="line">
+            <a:avLst/>
+          </a:prstGeom>
+          <a:solidFill>
+            <a:schemeClr val="accent1"/>
+          </a:solidFill>
+          <a:ln w="9525" cap="flat" cmpd="sng" algn="ctr">
+            <a:solidFill>
+              <a:schemeClr val="tx1"/>
+            </a:solidFill>
+            <a:prstDash val="solid"/>
+            <a:round/>
+            <a:headEnd type="none" w="med" len="med"/>
+            <a:tailEnd type="none" w="med" len="med"/>
+          </a:ln>
+          <a:effectLst/>
+          <a:extLst>
+            <a:ext uri="{AF507438-7753-43E0-B8FC-AC1667EBCBE1}">
+              <a14:hiddenEffects xmlns:a14="http://schemas.microsoft.com/office/drawing/2010/main">
+                <a:effectLst>
+                  <a:outerShdw dist="35921" dir="2700000" algn="ctr" rotWithShape="0">
+                    <a:schemeClr val="bg2"/>
+                  </a:outerShdw>
+                </a:effectLst>
+              </a14:hiddenEffects>
+            </a:ext>
+          </a:extLst>
+        </p:spPr>
+      </p:cxnSp>
+      <p:cxnSp>
+        <p:nvCxnSpPr>
+          <p:cNvPr id="12" name="Straight Arrow Connector 11"/>
+          <p:cNvCxnSpPr/>
+          <p:nvPr/>
+        </p:nvCxnSpPr>
+        <p:spPr bwMode="auto">
+          <a:xfrm flipH="1">
+            <a:off x="1117132" y="2438400"/>
+            <a:ext cx="1245068" cy="381000"/>
+          </a:xfrm>
+          <a:prstGeom prst="straightConnector1">
+            <a:avLst/>
+          </a:prstGeom>
+          <a:solidFill>
+            <a:schemeClr val="accent1"/>
+          </a:solidFill>
+          <a:ln w="9525" cap="flat" cmpd="sng" algn="ctr">
+            <a:solidFill>
+              <a:schemeClr val="tx1"/>
+            </a:solidFill>
+            <a:prstDash val="solid"/>
+            <a:round/>
+            <a:headEnd type="none" w="med" len="med"/>
+            <a:tailEnd type="triangle"/>
+          </a:ln>
+          <a:effectLst/>
+          <a:extLst>
+            <a:ext uri="{AF507438-7753-43E0-B8FC-AC1667EBCBE1}">
+              <a14:hiddenEffects xmlns:a14="http://schemas.microsoft.com/office/drawing/2010/main">
+                <a:effectLst>
+                  <a:outerShdw dist="35921" dir="2700000" algn="ctr" rotWithShape="0">
+                    <a:schemeClr val="bg2"/>
+                  </a:outerShdw>
+                </a:effectLst>
+              </a14:hiddenEffects>
+            </a:ext>
+          </a:extLst>
+        </p:spPr>
+      </p:cxnSp>
+      <p:cxnSp>
+        <p:nvCxnSpPr>
+          <p:cNvPr id="14" name="Straight Arrow Connector 13"/>
+          <p:cNvCxnSpPr/>
+          <p:nvPr/>
+        </p:nvCxnSpPr>
+        <p:spPr bwMode="auto">
+          <a:xfrm>
+            <a:off x="3059114" y="2438400"/>
+            <a:ext cx="47299" cy="484187"/>
+          </a:xfrm>
+          <a:prstGeom prst="straightConnector1">
+            <a:avLst/>
+          </a:prstGeom>
+          <a:solidFill>
+            <a:schemeClr val="accent1"/>
+          </a:solidFill>
+          <a:ln w="9525" cap="flat" cmpd="sng" algn="ctr">
+            <a:solidFill>
+              <a:schemeClr val="tx1"/>
+            </a:solidFill>
+            <a:prstDash val="solid"/>
+            <a:round/>
+            <a:headEnd type="none" w="med" len="med"/>
+            <a:tailEnd type="triangle"/>
+          </a:ln>
+          <a:effectLst/>
+          <a:extLst>
+            <a:ext uri="{AF507438-7753-43E0-B8FC-AC1667EBCBE1}">
+              <a14:hiddenEffects xmlns:a14="http://schemas.microsoft.com/office/drawing/2010/main">
+                <a:effectLst>
+                  <a:outerShdw dist="35921" dir="2700000" algn="ctr" rotWithShape="0">
+                    <a:schemeClr val="bg2"/>
+                  </a:outerShdw>
+                </a:effectLst>
+              </a14:hiddenEffects>
+            </a:ext>
+          </a:extLst>
+        </p:spPr>
+      </p:cxnSp>
+      <p:cxnSp>
+        <p:nvCxnSpPr>
+          <p:cNvPr id="16" name="Straight Arrow Connector 15"/>
+          <p:cNvCxnSpPr>
+            <a:endCxn id="26" idx="0"/>
+          </p:cNvCxnSpPr>
+          <p:nvPr/>
+        </p:nvCxnSpPr>
+        <p:spPr bwMode="auto">
+          <a:xfrm>
+            <a:off x="3962400" y="2386807"/>
+            <a:ext cx="774229" cy="535780"/>
+          </a:xfrm>
+          <a:prstGeom prst="straightConnector1">
+            <a:avLst/>
+          </a:prstGeom>
+          <a:solidFill>
+            <a:schemeClr val="accent1"/>
+          </a:solidFill>
+          <a:ln w="9525" cap="flat" cmpd="sng" algn="ctr">
+            <a:solidFill>
+              <a:schemeClr val="tx1"/>
+            </a:solidFill>
+            <a:prstDash val="solid"/>
+            <a:round/>
+            <a:headEnd type="none" w="med" len="med"/>
+            <a:tailEnd type="triangle"/>
+          </a:ln>
+          <a:effectLst/>
+          <a:extLst>
+            <a:ext uri="{AF507438-7753-43E0-B8FC-AC1667EBCBE1}">
+              <a14:hiddenEffects xmlns:a14="http://schemas.microsoft.com/office/drawing/2010/main">
+                <a:effectLst>
+                  <a:outerShdw dist="35921" dir="2700000" algn="ctr" rotWithShape="0">
+                    <a:schemeClr val="bg2"/>
+                  </a:outerShdw>
+                </a:effectLst>
+              </a14:hiddenEffects>
+            </a:ext>
+          </a:extLst>
+        </p:spPr>
+      </p:cxnSp>
+      <p:cxnSp>
+        <p:nvCxnSpPr>
+          <p:cNvPr id="18" name="Straight Arrow Connector 17"/>
+          <p:cNvCxnSpPr/>
+          <p:nvPr/>
+        </p:nvCxnSpPr>
+        <p:spPr bwMode="auto">
+          <a:xfrm>
+            <a:off x="4739408" y="2402744"/>
+            <a:ext cx="1427485" cy="482079"/>
+          </a:xfrm>
+          <a:prstGeom prst="straightConnector1">
+            <a:avLst/>
+          </a:prstGeom>
+          <a:solidFill>
+            <a:schemeClr val="accent1"/>
+          </a:solidFill>
+          <a:ln w="9525" cap="flat" cmpd="sng" algn="ctr">
+            <a:solidFill>
+              <a:schemeClr val="tx1"/>
+            </a:solidFill>
+            <a:prstDash val="solid"/>
+            <a:round/>
+            <a:headEnd type="none" w="med" len="med"/>
+            <a:tailEnd type="triangle"/>
+          </a:ln>
+          <a:effectLst/>
+          <a:extLst>
+            <a:ext uri="{AF507438-7753-43E0-B8FC-AC1667EBCBE1}">
+              <a14:hiddenEffects xmlns:a14="http://schemas.microsoft.com/office/drawing/2010/main">
+                <a:effectLst>
+                  <a:outerShdw dist="35921" dir="2700000" algn="ctr" rotWithShape="0">
+                    <a:schemeClr val="bg2"/>
+                  </a:outerShdw>
+                </a:effectLst>
+              </a14:hiddenEffects>
+            </a:ext>
+          </a:extLst>
+        </p:spPr>
+      </p:cxnSp>
+      <p:sp>
+        <p:nvSpPr>
+          <p:cNvPr id="19" name="Rectangle 18"/>
+          <p:cNvSpPr/>
+          <p:nvPr/>
+        </p:nvSpPr>
+        <p:spPr bwMode="auto">
+          <a:xfrm>
+            <a:off x="134381" y="2846387"/>
+            <a:ext cx="1920718" cy="658813"/>
+          </a:xfrm>
+          <a:prstGeom prst="rect">
+            <a:avLst/>
+          </a:prstGeom>
+          <a:solidFill>
+            <a:schemeClr val="bg1"/>
+          </a:solidFill>
+          <a:ln w="9525" cap="flat" cmpd="sng" algn="ctr">
+            <a:solidFill>
+              <a:schemeClr val="tx1"/>
+            </a:solidFill>
+            <a:prstDash val="solid"/>
+            <a:round/>
+            <a:headEnd type="none" w="med" len="med"/>
+            <a:tailEnd type="none" w="med" len="med"/>
+          </a:ln>
+          <a:effectLst/>
+          <a:extLst/>
+        </p:spPr>
+        <p:txBody>
+          <a:bodyPr vert="horz" wrap="square" lIns="91440" tIns="45720" rIns="91440" bIns="45720" numCol="1" rtlCol="0" anchor="t" anchorCtr="0" compatLnSpc="1">
+            <a:prstTxWarp prst="textNoShape">
+              <a:avLst/>
+            </a:prstTxWarp>
+          </a:bodyPr>
+          <a:lstStyle/>
+          <a:p>
+            <a:pPr marL="0" marR="0" indent="0" algn="l" defTabSz="914400" rtl="0" eaLnBrk="1" fontAlgn="base" latinLnBrk="0" hangingPunct="1">
+              <a:lnSpc>
+                <a:spcPct val="100000"/>
+              </a:lnSpc>
+              <a:spcBef>
+                <a:spcPct val="0"/>
+              </a:spcBef>
+              <a:spcAft>
+                <a:spcPct val="0"/>
+              </a:spcAft>
+              <a:buClrTx/>
+              <a:buSzTx/>
+              <a:buFontTx/>
+              <a:buNone/>
+              <a:tabLst/>
+            </a:pPr>
+            <a:endParaRPr kumimoji="0" lang="en-US" sz="3600" b="0" i="0" u="none" strike="noStrike" cap="none" normalizeH="0" baseline="0" smtClean="0">
+              <a:ln>
+                <a:noFill/>
+              </a:ln>
+              <a:solidFill>
+                <a:schemeClr val="tx2"/>
+              </a:solidFill>
+              <a:effectLst/>
+              <a:latin typeface="Futura LT Book" pitchFamily="2" charset="0"/>
+              <a:ea typeface="굴림" pitchFamily="34" charset="-127"/>
+            </a:endParaRPr>
+          </a:p>
+        </p:txBody>
+      </p:sp>
+      <p:cxnSp>
+        <p:nvCxnSpPr>
+          <p:cNvPr id="21" name="Straight Connector 20"/>
+          <p:cNvCxnSpPr/>
+          <p:nvPr/>
+        </p:nvCxnSpPr>
+        <p:spPr bwMode="auto">
+          <a:xfrm>
+            <a:off x="838200" y="2819400"/>
+            <a:ext cx="0" cy="685800"/>
+          </a:xfrm>
+          <a:prstGeom prst="line">
+            <a:avLst/>
+          </a:prstGeom>
+          <a:solidFill>
+            <a:schemeClr val="accent1"/>
+          </a:solidFill>
+          <a:ln w="9525" cap="flat" cmpd="sng" algn="ctr">
+            <a:solidFill>
+              <a:schemeClr val="tx1"/>
+            </a:solidFill>
+            <a:prstDash val="solid"/>
+            <a:round/>
+            <a:headEnd type="none" w="med" len="med"/>
+            <a:tailEnd type="none" w="med" len="med"/>
+          </a:ln>
+          <a:effectLst/>
+          <a:extLst>
+            <a:ext uri="{AF507438-7753-43E0-B8FC-AC1667EBCBE1}">
+              <a14:hiddenEffects xmlns:a14="http://schemas.microsoft.com/office/drawing/2010/main">
+                <a:effectLst>
+                  <a:outerShdw dist="35921" dir="2700000" algn="ctr" rotWithShape="0">
+                    <a:schemeClr val="bg2"/>
+                  </a:outerShdw>
+                </a:effectLst>
+              </a14:hiddenEffects>
+            </a:ext>
+          </a:extLst>
+        </p:spPr>
+      </p:cxnSp>
+      <p:cxnSp>
+        <p:nvCxnSpPr>
+          <p:cNvPr id="23" name="Straight Connector 22"/>
+          <p:cNvCxnSpPr/>
+          <p:nvPr/>
+        </p:nvCxnSpPr>
+        <p:spPr bwMode="auto">
+          <a:xfrm>
+            <a:off x="1447800" y="2819400"/>
+            <a:ext cx="0" cy="658813"/>
+          </a:xfrm>
+          <a:prstGeom prst="line">
+            <a:avLst/>
+          </a:prstGeom>
+          <a:solidFill>
+            <a:schemeClr val="accent1"/>
+          </a:solidFill>
+          <a:ln w="9525" cap="flat" cmpd="sng" algn="ctr">
+            <a:solidFill>
+              <a:schemeClr val="tx1"/>
+            </a:solidFill>
+            <a:prstDash val="solid"/>
+            <a:round/>
+            <a:headEnd type="none" w="med" len="med"/>
+            <a:tailEnd type="none" w="med" len="med"/>
+          </a:ln>
+          <a:effectLst/>
+          <a:extLst>
+            <a:ext uri="{AF507438-7753-43E0-B8FC-AC1667EBCBE1}">
+              <a14:hiddenEffects xmlns:a14="http://schemas.microsoft.com/office/drawing/2010/main">
+                <a:effectLst>
+                  <a:outerShdw dist="35921" dir="2700000" algn="ctr" rotWithShape="0">
+                    <a:schemeClr val="bg2"/>
+                  </a:outerShdw>
+                </a:effectLst>
+              </a14:hiddenEffects>
+            </a:ext>
+          </a:extLst>
+        </p:spPr>
+      </p:cxnSp>
+      <p:sp>
+        <p:nvSpPr>
+          <p:cNvPr id="25" name="Rectangle 24"/>
+          <p:cNvSpPr/>
+          <p:nvPr/>
+        </p:nvSpPr>
+        <p:spPr bwMode="auto">
+          <a:xfrm>
+            <a:off x="2362200" y="2922587"/>
+            <a:ext cx="1458912" cy="582613"/>
+          </a:xfrm>
+          <a:prstGeom prst="rect">
+            <a:avLst/>
+          </a:prstGeom>
+          <a:solidFill>
+            <a:schemeClr val="bg1"/>
+          </a:solidFill>
+          <a:ln w="9525" cap="flat" cmpd="sng" algn="ctr">
+            <a:solidFill>
+              <a:schemeClr val="tx1"/>
+            </a:solidFill>
+            <a:prstDash val="solid"/>
+            <a:round/>
+            <a:headEnd type="none" w="med" len="med"/>
+            <a:tailEnd type="none" w="med" len="med"/>
+          </a:ln>
+          <a:effectLst/>
+          <a:extLst/>
+        </p:spPr>
+        <p:txBody>
+          <a:bodyPr vert="horz" wrap="square" lIns="91440" tIns="45720" rIns="91440" bIns="45720" numCol="1" rtlCol="0" anchor="t" anchorCtr="0" compatLnSpc="1">
+            <a:prstTxWarp prst="textNoShape">
+              <a:avLst/>
+            </a:prstTxWarp>
+          </a:bodyPr>
+          <a:lstStyle/>
+          <a:p>
+            <a:pPr marL="0" marR="0" indent="0" algn="l" defTabSz="914400" rtl="0" eaLnBrk="1" fontAlgn="base" latinLnBrk="0" hangingPunct="1">
+              <a:lnSpc>
+                <a:spcPct val="100000"/>
+              </a:lnSpc>
+              <a:spcBef>
+                <a:spcPct val="0"/>
+              </a:spcBef>
+              <a:spcAft>
+                <a:spcPct val="0"/>
+              </a:spcAft>
+              <a:buClrTx/>
+              <a:buSzTx/>
+              <a:buFontTx/>
+              <a:buNone/>
+              <a:tabLst/>
+            </a:pPr>
+            <a:endParaRPr kumimoji="0" lang="en-US" sz="3600" b="0" i="0" u="none" strike="noStrike" cap="none" normalizeH="0" baseline="0" smtClean="0">
+              <a:ln>
+                <a:noFill/>
+              </a:ln>
+              <a:solidFill>
+                <a:schemeClr val="tx2"/>
+              </a:solidFill>
+              <a:effectLst/>
+              <a:latin typeface="Futura LT Book" pitchFamily="2" charset="0"/>
+              <a:ea typeface="굴림" pitchFamily="34" charset="-127"/>
+            </a:endParaRPr>
+          </a:p>
+        </p:txBody>
+      </p:sp>
+      <p:sp>
+        <p:nvSpPr>
+          <p:cNvPr id="26" name="Rectangle 25"/>
+          <p:cNvSpPr/>
+          <p:nvPr/>
+        </p:nvSpPr>
+        <p:spPr bwMode="auto">
+          <a:xfrm>
+            <a:off x="4038599" y="2922587"/>
+            <a:ext cx="1396059" cy="555626"/>
+          </a:xfrm>
+          <a:prstGeom prst="rect">
+            <a:avLst/>
+          </a:prstGeom>
+          <a:solidFill>
+            <a:schemeClr val="bg1"/>
+          </a:solidFill>
+          <a:ln w="9525" cap="flat" cmpd="sng" algn="ctr">
+            <a:solidFill>
+              <a:schemeClr val="tx1"/>
+            </a:solidFill>
+            <a:prstDash val="solid"/>
+            <a:round/>
+            <a:headEnd type="none" w="med" len="med"/>
+            <a:tailEnd type="none" w="med" len="med"/>
+          </a:ln>
+          <a:effectLst/>
+          <a:extLst/>
+        </p:spPr>
+        <p:txBody>
+          <a:bodyPr vert="horz" wrap="square" lIns="91440" tIns="45720" rIns="91440" bIns="45720" numCol="1" rtlCol="0" anchor="t" anchorCtr="0" compatLnSpc="1">
+            <a:prstTxWarp prst="textNoShape">
+              <a:avLst/>
+            </a:prstTxWarp>
+          </a:bodyPr>
+          <a:lstStyle/>
+          <a:p>
+            <a:pPr marL="0" marR="0" indent="0" algn="l" defTabSz="914400" rtl="0" eaLnBrk="1" fontAlgn="base" latinLnBrk="0" hangingPunct="1">
+              <a:lnSpc>
+                <a:spcPct val="100000"/>
+              </a:lnSpc>
+              <a:spcBef>
+                <a:spcPct val="0"/>
+              </a:spcBef>
+              <a:spcAft>
+                <a:spcPct val="0"/>
+              </a:spcAft>
+              <a:buClrTx/>
+              <a:buSzTx/>
+              <a:buFontTx/>
+              <a:buNone/>
+              <a:tabLst/>
+            </a:pPr>
+            <a:endParaRPr kumimoji="0" lang="en-US" sz="3600" b="0" i="0" u="none" strike="noStrike" cap="none" normalizeH="0" baseline="0" smtClean="0">
+              <a:ln>
+                <a:noFill/>
+              </a:ln>
+              <a:solidFill>
+                <a:schemeClr val="tx2"/>
+              </a:solidFill>
+              <a:effectLst/>
+              <a:latin typeface="Futura LT Book" pitchFamily="2" charset="0"/>
+              <a:ea typeface="굴림" pitchFamily="34" charset="-127"/>
+            </a:endParaRPr>
+          </a:p>
+        </p:txBody>
+      </p:sp>
+      <p:sp>
+        <p:nvSpPr>
+          <p:cNvPr id="27" name="Rectangle 26"/>
+          <p:cNvSpPr/>
+          <p:nvPr/>
+        </p:nvSpPr>
+        <p:spPr bwMode="auto">
+          <a:xfrm>
+            <a:off x="5612930" y="2894683"/>
+            <a:ext cx="1154112" cy="582613"/>
+          </a:xfrm>
+          <a:prstGeom prst="rect">
+            <a:avLst/>
+          </a:prstGeom>
+          <a:solidFill>
+            <a:schemeClr val="bg1"/>
+          </a:solidFill>
+          <a:ln w="9525" cap="flat" cmpd="sng" algn="ctr">
+            <a:solidFill>
+              <a:schemeClr val="tx1"/>
+            </a:solidFill>
+            <a:prstDash val="solid"/>
+            <a:round/>
+            <a:headEnd type="none" w="med" len="med"/>
+            <a:tailEnd type="none" w="med" len="med"/>
+          </a:ln>
+          <a:effectLst/>
+          <a:extLst/>
+        </p:spPr>
+        <p:txBody>
+          <a:bodyPr vert="horz" wrap="square" lIns="91440" tIns="45720" rIns="91440" bIns="45720" numCol="1" rtlCol="0" anchor="t" anchorCtr="0" compatLnSpc="1">
+            <a:prstTxWarp prst="textNoShape">
+              <a:avLst/>
+            </a:prstTxWarp>
+          </a:bodyPr>
+          <a:lstStyle/>
+          <a:p>
+            <a:pPr marL="0" marR="0" indent="0" algn="l" defTabSz="914400" rtl="0" eaLnBrk="1" fontAlgn="base" latinLnBrk="0" hangingPunct="1">
+              <a:lnSpc>
+                <a:spcPct val="100000"/>
+              </a:lnSpc>
+              <a:spcBef>
+                <a:spcPct val="0"/>
+              </a:spcBef>
+              <a:spcAft>
+                <a:spcPct val="0"/>
+              </a:spcAft>
+              <a:buClrTx/>
+              <a:buSzTx/>
+              <a:buFontTx/>
+              <a:buNone/>
+              <a:tabLst/>
+            </a:pPr>
+            <a:endParaRPr kumimoji="0" lang="en-US" sz="3600" b="0" i="0" u="none" strike="noStrike" cap="none" normalizeH="0" baseline="0" smtClean="0">
+              <a:ln>
+                <a:noFill/>
+              </a:ln>
+              <a:solidFill>
+                <a:schemeClr val="tx2"/>
+              </a:solidFill>
+              <a:effectLst/>
+              <a:latin typeface="Futura LT Book" pitchFamily="2" charset="0"/>
+              <a:ea typeface="굴림" pitchFamily="34" charset="-127"/>
+            </a:endParaRPr>
+          </a:p>
+        </p:txBody>
+      </p:sp>
+      <p:cxnSp>
+        <p:nvCxnSpPr>
+          <p:cNvPr id="29" name="Straight Connector 28"/>
+          <p:cNvCxnSpPr>
+            <a:stCxn id="25" idx="0"/>
+            <a:endCxn id="25" idx="2"/>
+          </p:cNvCxnSpPr>
+          <p:nvPr/>
+        </p:nvCxnSpPr>
+        <p:spPr bwMode="auto">
+          <a:xfrm>
+            <a:off x="3091656" y="2922587"/>
+            <a:ext cx="0" cy="582613"/>
+          </a:xfrm>
+          <a:prstGeom prst="line">
+            <a:avLst/>
+          </a:prstGeom>
+          <a:solidFill>
+            <a:schemeClr val="accent1"/>
+          </a:solidFill>
+          <a:ln w="9525" cap="flat" cmpd="sng" algn="ctr">
+            <a:solidFill>
+              <a:schemeClr val="tx1"/>
+            </a:solidFill>
+            <a:prstDash val="solid"/>
+            <a:round/>
+            <a:headEnd type="none" w="med" len="med"/>
+            <a:tailEnd type="none" w="med" len="med"/>
+          </a:ln>
+          <a:effectLst/>
+          <a:extLst>
+            <a:ext uri="{AF507438-7753-43E0-B8FC-AC1667EBCBE1}">
+              <a14:hiddenEffects xmlns:a14="http://schemas.microsoft.com/office/drawing/2010/main">
+                <a:effectLst>
+                  <a:outerShdw dist="35921" dir="2700000" algn="ctr" rotWithShape="0">
+                    <a:schemeClr val="bg2"/>
+                  </a:outerShdw>
+                </a:effectLst>
+              </a14:hiddenEffects>
+            </a:ext>
+          </a:extLst>
+        </p:spPr>
+      </p:cxnSp>
+      <p:cxnSp>
+        <p:nvCxnSpPr>
+          <p:cNvPr id="31" name="Straight Connector 30"/>
+          <p:cNvCxnSpPr>
+            <a:stCxn id="26" idx="0"/>
+            <a:endCxn id="26" idx="2"/>
+          </p:cNvCxnSpPr>
+          <p:nvPr/>
+        </p:nvCxnSpPr>
+        <p:spPr bwMode="auto">
+          <a:xfrm>
+            <a:off x="4736629" y="2922587"/>
+            <a:ext cx="0" cy="555626"/>
+          </a:xfrm>
+          <a:prstGeom prst="line">
+            <a:avLst/>
+          </a:prstGeom>
+          <a:solidFill>
+            <a:schemeClr val="accent1"/>
+          </a:solidFill>
+          <a:ln w="9525" cap="flat" cmpd="sng" algn="ctr">
+            <a:solidFill>
+              <a:schemeClr val="tx1"/>
+            </a:solidFill>
+            <a:prstDash val="solid"/>
+            <a:round/>
+            <a:headEnd type="none" w="med" len="med"/>
+            <a:tailEnd type="none" w="med" len="med"/>
+          </a:ln>
+          <a:effectLst/>
+          <a:extLst>
+            <a:ext uri="{AF507438-7753-43E0-B8FC-AC1667EBCBE1}">
+              <a14:hiddenEffects xmlns:a14="http://schemas.microsoft.com/office/drawing/2010/main">
+                <a:effectLst>
+                  <a:outerShdw dist="35921" dir="2700000" algn="ctr" rotWithShape="0">
+                    <a:schemeClr val="bg2"/>
+                  </a:outerShdw>
+                </a:effectLst>
+              </a14:hiddenEffects>
+            </a:ext>
+          </a:extLst>
+        </p:spPr>
+      </p:cxnSp>
+      <p:cxnSp>
+        <p:nvCxnSpPr>
+          <p:cNvPr id="33" name="Straight Connector 32"/>
+          <p:cNvCxnSpPr/>
+          <p:nvPr/>
+        </p:nvCxnSpPr>
+        <p:spPr bwMode="auto">
+          <a:xfrm>
+            <a:off x="6157442" y="2867696"/>
+            <a:ext cx="0" cy="582613"/>
+          </a:xfrm>
+          <a:prstGeom prst="line">
+            <a:avLst/>
+          </a:prstGeom>
+          <a:solidFill>
+            <a:schemeClr val="accent1"/>
+          </a:solidFill>
+          <a:ln w="9525" cap="flat" cmpd="sng" algn="ctr">
+            <a:solidFill>
+              <a:schemeClr val="tx1"/>
+            </a:solidFill>
+            <a:prstDash val="solid"/>
+            <a:round/>
+            <a:headEnd type="none" w="med" len="med"/>
+            <a:tailEnd type="none" w="med" len="med"/>
+          </a:ln>
+          <a:effectLst/>
+          <a:extLst>
+            <a:ext uri="{AF507438-7753-43E0-B8FC-AC1667EBCBE1}">
+              <a14:hiddenEffects xmlns:a14="http://schemas.microsoft.com/office/drawing/2010/main">
+                <a:effectLst>
+                  <a:outerShdw dist="35921" dir="2700000" algn="ctr" rotWithShape="0">
+                    <a:schemeClr val="bg2"/>
+                  </a:outerShdw>
+                </a:effectLst>
+              </a14:hiddenEffects>
+            </a:ext>
+          </a:extLst>
+        </p:spPr>
+      </p:cxnSp>
+      <p:sp>
+        <p:nvSpPr>
+          <p:cNvPr id="34" name="TextBox 33"/>
+          <p:cNvSpPr txBox="1"/>
+          <p:nvPr/>
         </p:nvSpPr>
         <p:spPr>
           <a:xfrm>
-            <a:off x="3203575" y="115888"/>
-            <a:ext cx="5472113" cy="1081087"/>
+            <a:off x="2209800" y="1752600"/>
+            <a:ext cx="849313" cy="523220"/>
           </a:xfrm>
+          <a:prstGeom prst="rect">
+            <a:avLst/>
+          </a:prstGeom>
+          <a:noFill/>
         </p:spPr>
         <p:txBody>
-          <a:bodyPr/>
+          <a:bodyPr wrap="square" rtlCol="0">
+            <a:spAutoFit/>
+          </a:bodyPr>
           <a:lstStyle/>
           <a:p>
             <a:r>
-              <a:rPr lang="en-US" altLang="en-US" smtClean="0"/>
-              <a:t>Properties </a:t>
-            </a:r>
-            <a:r>
-              <a:rPr lang="en-US" altLang="en-US" dirty="0" smtClean="0"/>
-              <a:t>of B-Tree</a:t>
-            </a:r>
-            <a:endParaRPr lang="uk-UA" altLang="en-US" dirty="0"/>
-          </a:p>
-        </p:txBody>
-      </p:sp>
-      <p:sp>
-        <p:nvSpPr>
-          <p:cNvPr id="36867" name="Rectangle 3"/>
-          <p:cNvSpPr>
-            <a:spLocks noGrp="1" noChangeArrowheads="1"/>
-          </p:cNvSpPr>
-          <p:nvPr>
-            <p:ph type="body" idx="1"/>
-          </p:nvPr>
+              <a:rPr lang="en-US" sz="2800" dirty="0" smtClean="0"/>
+              <a:t>100</a:t>
+            </a:r>
+            <a:endParaRPr lang="en-US" sz="2800" dirty="0"/>
+          </a:p>
+        </p:txBody>
+      </p:sp>
+      <p:sp>
+        <p:nvSpPr>
+          <p:cNvPr id="35" name="TextBox 34"/>
+          <p:cNvSpPr txBox="1"/>
+          <p:nvPr/>
         </p:nvSpPr>
         <p:spPr>
           <a:xfrm>
-            <a:off x="468313" y="1484313"/>
-            <a:ext cx="8207375" cy="4754562"/>
+            <a:off x="3059113" y="1752600"/>
+            <a:ext cx="903287" cy="523220"/>
           </a:xfrm>
+          <a:prstGeom prst="rect">
+            <a:avLst/>
+          </a:prstGeom>
+          <a:noFill/>
         </p:spPr>
         <p:txBody>
-          <a:bodyPr/>
+          <a:bodyPr wrap="square" rtlCol="0">
+            <a:spAutoFit/>
+          </a:bodyPr>
           <a:lstStyle/>
           <a:p>
-            <a:pPr>
+            <a:r>
+              <a:rPr lang="en-US" sz="2800" dirty="0" smtClean="0"/>
+              <a:t>155</a:t>
+            </a:r>
+            <a:endParaRPr lang="en-US" sz="2800" dirty="0"/>
+          </a:p>
+        </p:txBody>
+      </p:sp>
+      <p:sp>
+        <p:nvSpPr>
+          <p:cNvPr id="36" name="TextBox 35"/>
+          <p:cNvSpPr txBox="1"/>
+          <p:nvPr/>
+        </p:nvSpPr>
+        <p:spPr>
+          <a:xfrm>
+            <a:off x="3962400" y="1801486"/>
+            <a:ext cx="838200" cy="523220"/>
+          </a:xfrm>
+          <a:prstGeom prst="rect">
+            <a:avLst/>
+          </a:prstGeom>
+          <a:noFill/>
+        </p:spPr>
+        <p:txBody>
+          <a:bodyPr wrap="square" rtlCol="0">
+            <a:spAutoFit/>
+          </a:bodyPr>
+          <a:lstStyle/>
+          <a:p>
+            <a:r>
+              <a:rPr lang="en-US" sz="2800" dirty="0" smtClean="0"/>
+              <a:t>226</a:t>
+            </a:r>
+            <a:endParaRPr lang="en-US" sz="2800" dirty="0"/>
+          </a:p>
+        </p:txBody>
+      </p:sp>
+      <p:sp>
+        <p:nvSpPr>
+          <p:cNvPr id="37" name="TextBox 36"/>
+          <p:cNvSpPr txBox="1"/>
+          <p:nvPr/>
+        </p:nvSpPr>
+        <p:spPr>
+          <a:xfrm>
+            <a:off x="134381" y="2922587"/>
+            <a:ext cx="703819" cy="523220"/>
+          </a:xfrm>
+          <a:prstGeom prst="rect">
+            <a:avLst/>
+          </a:prstGeom>
+          <a:noFill/>
+        </p:spPr>
+        <p:txBody>
+          <a:bodyPr wrap="square" rtlCol="0">
+            <a:spAutoFit/>
+          </a:bodyPr>
+          <a:lstStyle/>
+          <a:p>
+            <a:r>
+              <a:rPr lang="en-US" sz="2800" dirty="0" smtClean="0"/>
+              <a:t>48</a:t>
+            </a:r>
+            <a:endParaRPr lang="en-US" sz="2800" dirty="0"/>
+          </a:p>
+        </p:txBody>
+      </p:sp>
+      <p:sp>
+        <p:nvSpPr>
+          <p:cNvPr id="38" name="TextBox 37"/>
+          <p:cNvSpPr txBox="1"/>
+          <p:nvPr/>
+        </p:nvSpPr>
+        <p:spPr>
+          <a:xfrm>
+            <a:off x="838200" y="2846387"/>
+            <a:ext cx="609600" cy="523220"/>
+          </a:xfrm>
+          <a:prstGeom prst="rect">
+            <a:avLst/>
+          </a:prstGeom>
+          <a:noFill/>
+        </p:spPr>
+        <p:txBody>
+          <a:bodyPr wrap="square" rtlCol="0">
+            <a:spAutoFit/>
+          </a:bodyPr>
+          <a:lstStyle/>
+          <a:p>
+            <a:r>
+              <a:rPr lang="en-US" sz="2800" dirty="0" smtClean="0"/>
+              <a:t>50</a:t>
+            </a:r>
+            <a:endParaRPr lang="en-US" sz="2800" dirty="0"/>
+          </a:p>
+        </p:txBody>
+      </p:sp>
+      <p:sp>
+        <p:nvSpPr>
+          <p:cNvPr id="39" name="TextBox 38"/>
+          <p:cNvSpPr txBox="1"/>
+          <p:nvPr/>
+        </p:nvSpPr>
+        <p:spPr>
+          <a:xfrm>
+            <a:off x="1447800" y="2846387"/>
+            <a:ext cx="607299" cy="523220"/>
+          </a:xfrm>
+          <a:prstGeom prst="rect">
+            <a:avLst/>
+          </a:prstGeom>
+          <a:noFill/>
+        </p:spPr>
+        <p:txBody>
+          <a:bodyPr wrap="square" rtlCol="0">
+            <a:spAutoFit/>
+          </a:bodyPr>
+          <a:lstStyle/>
+          <a:p>
+            <a:r>
+              <a:rPr lang="en-US" sz="2800" dirty="0" smtClean="0"/>
+              <a:t>79</a:t>
+            </a:r>
+            <a:endParaRPr lang="en-US" sz="2800" dirty="0"/>
+          </a:p>
+        </p:txBody>
+      </p:sp>
+      <p:sp>
+        <p:nvSpPr>
+          <p:cNvPr id="40" name="TextBox 39"/>
+          <p:cNvSpPr txBox="1"/>
+          <p:nvPr/>
+        </p:nvSpPr>
+        <p:spPr>
+          <a:xfrm>
+            <a:off x="2220912" y="2922587"/>
+            <a:ext cx="731838" cy="461665"/>
+          </a:xfrm>
+          <a:prstGeom prst="rect">
+            <a:avLst/>
+          </a:prstGeom>
+          <a:noFill/>
+        </p:spPr>
+        <p:txBody>
+          <a:bodyPr wrap="square" rtlCol="0">
+            <a:spAutoFit/>
+          </a:bodyPr>
+          <a:lstStyle/>
+          <a:p>
+            <a:r>
+              <a:rPr lang="en-US" sz="2400" dirty="0" smtClean="0"/>
+              <a:t>128</a:t>
+            </a:r>
+            <a:endParaRPr lang="en-US" sz="1800" dirty="0"/>
+          </a:p>
+        </p:txBody>
+      </p:sp>
+      <p:sp>
+        <p:nvSpPr>
+          <p:cNvPr id="42" name="TextBox 41"/>
+          <p:cNvSpPr txBox="1"/>
+          <p:nvPr/>
+        </p:nvSpPr>
+        <p:spPr>
+          <a:xfrm>
+            <a:off x="3094038" y="2922587"/>
+            <a:ext cx="761998" cy="461665"/>
+          </a:xfrm>
+          <a:prstGeom prst="rect">
+            <a:avLst/>
+          </a:prstGeom>
+          <a:noFill/>
+        </p:spPr>
+        <p:txBody>
+          <a:bodyPr wrap="square" rtlCol="0">
+            <a:spAutoFit/>
+          </a:bodyPr>
+          <a:lstStyle/>
+          <a:p>
+            <a:r>
+              <a:rPr lang="en-US" sz="2400" dirty="0" smtClean="0"/>
+              <a:t>140</a:t>
+            </a:r>
+            <a:endParaRPr lang="en-US" sz="2400" dirty="0"/>
+          </a:p>
+        </p:txBody>
+      </p:sp>
+      <p:sp>
+        <p:nvSpPr>
+          <p:cNvPr id="48" name="TextBox 47"/>
+          <p:cNvSpPr txBox="1"/>
+          <p:nvPr/>
+        </p:nvSpPr>
+        <p:spPr>
+          <a:xfrm>
+            <a:off x="4038599" y="2922587"/>
+            <a:ext cx="698030" cy="461665"/>
+          </a:xfrm>
+          <a:prstGeom prst="rect">
+            <a:avLst/>
+          </a:prstGeom>
+          <a:noFill/>
+        </p:spPr>
+        <p:txBody>
+          <a:bodyPr wrap="square" rtlCol="0">
+            <a:spAutoFit/>
+          </a:bodyPr>
+          <a:lstStyle/>
+          <a:p>
+            <a:r>
+              <a:rPr lang="en-US" sz="2400" dirty="0" smtClean="0"/>
+              <a:t>168</a:t>
+            </a:r>
+            <a:endParaRPr lang="en-US" sz="2400" dirty="0"/>
+          </a:p>
+        </p:txBody>
+      </p:sp>
+      <p:sp>
+        <p:nvSpPr>
+          <p:cNvPr id="49" name="TextBox 48"/>
+          <p:cNvSpPr txBox="1"/>
+          <p:nvPr/>
+        </p:nvSpPr>
+        <p:spPr>
+          <a:xfrm>
+            <a:off x="4762501" y="2922587"/>
+            <a:ext cx="748356" cy="461665"/>
+          </a:xfrm>
+          <a:prstGeom prst="rect">
+            <a:avLst/>
+          </a:prstGeom>
+          <a:noFill/>
+        </p:spPr>
+        <p:txBody>
+          <a:bodyPr wrap="square" rtlCol="0">
+            <a:spAutoFit/>
+          </a:bodyPr>
+          <a:lstStyle/>
+          <a:p>
+            <a:r>
+              <a:rPr lang="en-US" sz="2400" dirty="0" smtClean="0"/>
+              <a:t>200</a:t>
+            </a:r>
+            <a:endParaRPr lang="en-US" sz="2400" dirty="0"/>
+          </a:p>
+        </p:txBody>
+      </p:sp>
+      <p:sp>
+        <p:nvSpPr>
+          <p:cNvPr id="50" name="TextBox 49"/>
+          <p:cNvSpPr txBox="1"/>
+          <p:nvPr/>
+        </p:nvSpPr>
+        <p:spPr>
+          <a:xfrm>
+            <a:off x="5549770" y="2928169"/>
+            <a:ext cx="770085" cy="461665"/>
+          </a:xfrm>
+          <a:prstGeom prst="rect">
+            <a:avLst/>
+          </a:prstGeom>
+          <a:noFill/>
+        </p:spPr>
+        <p:txBody>
+          <a:bodyPr wrap="square" rtlCol="0">
+            <a:spAutoFit/>
+          </a:bodyPr>
+          <a:lstStyle/>
+          <a:p>
+            <a:r>
+              <a:rPr lang="en-US" sz="2400" dirty="0" smtClean="0"/>
+              <a:t>270</a:t>
+            </a:r>
+            <a:endParaRPr lang="en-US" sz="2400" dirty="0"/>
+          </a:p>
+        </p:txBody>
+      </p:sp>
+      <p:sp>
+        <p:nvSpPr>
+          <p:cNvPr id="51" name="TextBox 50"/>
+          <p:cNvSpPr txBox="1"/>
+          <p:nvPr/>
+        </p:nvSpPr>
+        <p:spPr>
+          <a:xfrm>
+            <a:off x="6157442" y="2922587"/>
+            <a:ext cx="824560" cy="461665"/>
+          </a:xfrm>
+          <a:prstGeom prst="rect">
+            <a:avLst/>
+          </a:prstGeom>
+          <a:noFill/>
+        </p:spPr>
+        <p:txBody>
+          <a:bodyPr wrap="square" rtlCol="0">
+            <a:spAutoFit/>
+          </a:bodyPr>
+          <a:lstStyle/>
+          <a:p>
+            <a:r>
+              <a:rPr lang="en-US" sz="2400" dirty="0" smtClean="0"/>
+              <a:t>290</a:t>
+            </a:r>
+            <a:endParaRPr lang="en-US" sz="2400" dirty="0"/>
+          </a:p>
+        </p:txBody>
+      </p:sp>
+      <p:sp>
+        <p:nvSpPr>
+          <p:cNvPr id="53" name="TextBox 52"/>
+          <p:cNvSpPr txBox="1"/>
+          <p:nvPr/>
+        </p:nvSpPr>
+        <p:spPr>
+          <a:xfrm>
+            <a:off x="304800" y="3810000"/>
+            <a:ext cx="8839200" cy="2308324"/>
+          </a:xfrm>
+          <a:prstGeom prst="rect">
+            <a:avLst/>
+          </a:prstGeom>
+          <a:noFill/>
+        </p:spPr>
+        <p:txBody>
+          <a:bodyPr wrap="square" rtlCol="0">
+            <a:spAutoFit/>
+          </a:bodyPr>
+          <a:lstStyle/>
+          <a:p>
+            <a:pPr marL="571500" indent="-571500">
               <a:lnSpc>
                 <a:spcPct val="80000"/>
               </a:lnSpc>
+              <a:buFont typeface="Arial" panose="020B0604020202020204" pitchFamily="34" charset="0"/>
+              <a:buChar char="•"/>
             </a:pPr>
             <a:r>
-              <a:rPr lang="en-US" dirty="0" smtClean="0"/>
-              <a:t>Multiway </a:t>
-            </a:r>
-            <a:r>
               <a:rPr lang="en-US" dirty="0"/>
-              <a:t>tree allow node to have more than two children.</a:t>
-            </a:r>
-          </a:p>
-          <a:p>
-            <a:pPr>
+              <a:t>Multiway tree allow node to have more than two children.</a:t>
+            </a:r>
+          </a:p>
+          <a:p>
+            <a:pPr marL="571500" indent="-571500">
               <a:lnSpc>
                 <a:spcPct val="80000"/>
               </a:lnSpc>
+              <a:buFont typeface="Arial" panose="020B0604020202020204" pitchFamily="34" charset="0"/>
+              <a:buChar char="•"/>
             </a:pPr>
             <a:r>
-              <a:rPr lang="en-US" dirty="0" smtClean="0"/>
-              <a:t>Nodes </a:t>
-            </a:r>
-            <a:r>
               <a:rPr lang="en-US" dirty="0"/>
-              <a:t>can carry multiple keys.</a:t>
-            </a:r>
-          </a:p>
-          <a:p>
-            <a:pPr>
+              <a:t>Nodes can carry multiple keys.</a:t>
+            </a:r>
+          </a:p>
+          <a:p>
+            <a:pPr marL="571500" indent="-571500">
               <a:lnSpc>
                 <a:spcPct val="80000"/>
               </a:lnSpc>
+              <a:buFont typeface="Arial" panose="020B0604020202020204" pitchFamily="34" charset="0"/>
+              <a:buChar char="•"/>
             </a:pPr>
             <a:r>
-              <a:rPr lang="en-US" dirty="0" smtClean="0"/>
-              <a:t>Each </a:t>
-            </a:r>
-            <a:r>
               <a:rPr lang="en-US" dirty="0"/>
-              <a:t>node can have n </a:t>
-            </a:r>
-            <a:r>
-              <a:rPr lang="en-US" dirty="0" smtClean="0"/>
-              <a:t>children </a:t>
-            </a:r>
-            <a:r>
-              <a:rPr lang="en-US" dirty="0"/>
-              <a:t>for n-1 keys.</a:t>
-            </a:r>
-          </a:p>
-          <a:p>
-            <a:pPr>
-              <a:lnSpc>
-                <a:spcPct val="80000"/>
-              </a:lnSpc>
-            </a:pPr>
-            <a:r>
-              <a:rPr lang="en-US" dirty="0" smtClean="0"/>
-              <a:t>The </a:t>
-            </a:r>
-            <a:r>
-              <a:rPr lang="en-US" dirty="0"/>
-              <a:t>tree maintain all keys at same level.</a:t>
-            </a:r>
-          </a:p>
-          <a:p>
-            <a:pPr>
-              <a:lnSpc>
-                <a:spcPct val="80000"/>
-              </a:lnSpc>
-            </a:pPr>
-            <a:r>
-              <a:rPr lang="en-US" dirty="0" smtClean="0"/>
-              <a:t>This </a:t>
-            </a:r>
-            <a:r>
-              <a:rPr lang="en-US" dirty="0"/>
-              <a:t>type of tree is used when data is accessed/stored is located in secondary </a:t>
-            </a:r>
-            <a:r>
-              <a:rPr lang="en-US" dirty="0" smtClean="0"/>
-              <a:t>devices.</a:t>
-            </a:r>
-            <a:endParaRPr lang="en-US" dirty="0"/>
-          </a:p>
-          <a:p>
-            <a:pPr>
-              <a:lnSpc>
-                <a:spcPct val="80000"/>
-              </a:lnSpc>
-            </a:pPr>
-            <a:r>
-              <a:rPr lang="en-US" dirty="0" smtClean="0"/>
-              <a:t>Each non root </a:t>
-            </a:r>
-            <a:r>
-              <a:rPr lang="en-US" dirty="0"/>
-              <a:t>and each </a:t>
-            </a:r>
-            <a:r>
-              <a:rPr lang="en-US" dirty="0" smtClean="0"/>
-              <a:t>non leaf </a:t>
-            </a:r>
-            <a:r>
-              <a:rPr lang="en-US" dirty="0"/>
-              <a:t>node have at least m/2 nonempty children.</a:t>
-            </a:r>
-          </a:p>
-          <a:p>
-            <a:pPr>
-              <a:lnSpc>
-                <a:spcPct val="80000"/>
-              </a:lnSpc>
-            </a:pPr>
-            <a:r>
-              <a:rPr lang="en-US" dirty="0" smtClean="0"/>
-              <a:t>A </a:t>
-            </a:r>
-            <a:r>
-              <a:rPr lang="en-US" dirty="0"/>
-              <a:t>non root node has between n-1 and 2n-1 nodes.</a:t>
-            </a:r>
-          </a:p>
-          <a:p>
-            <a:pPr>
-              <a:lnSpc>
-                <a:spcPct val="80000"/>
-              </a:lnSpc>
-            </a:pPr>
-            <a:r>
-              <a:rPr lang="en-US" dirty="0" smtClean="0"/>
-              <a:t> </a:t>
-            </a:r>
-            <a:r>
-              <a:rPr lang="en-US" dirty="0"/>
-              <a:t>All the keys in the node is sorted.</a:t>
-            </a:r>
-            <a:endParaRPr lang="uk-UA" altLang="en-US" dirty="0"/>
+              <a:t>Each node can have n children for n-1 keys</a:t>
+            </a:r>
           </a:p>
         </p:txBody>
       </p:sp>
     </p:spTree>
+    <p:extLst>
+      <p:ext uri="{BB962C8B-B14F-4D97-AF65-F5344CB8AC3E}">
+        <p14:creationId xmlns:p14="http://schemas.microsoft.com/office/powerpoint/2010/main" val="77881190"/>
+      </p:ext>
+    </p:extLst>
   </p:cSld>
   <p:clrMapOvr>
     <a:masterClrMapping/>
   </p:clrMapOvr>
-  <p:timing>
-    <p:tnLst>
-      <p:par>
-        <p:cTn id="1" dur="indefinite" restart="never" nodeType="tmRoot"/>
-      </p:par>
-    </p:tnLst>
-  </p:timing>
 </p:sld>
 </file>
 
@@ -7457,7 +8494,7 @@
           <a:bodyPr/>
           <a:lstStyle/>
           <a:p>
-            <a:fld id="{E559C099-5EB3-45CB-8F43-155CF13A2BDD}" type="slidenum">
+            <a:fld id="{C49A274E-CC01-4F38-A825-231E9BD0B7CE}" type="slidenum">
               <a:rPr lang="ru-RU" altLang="en-US"/>
               <a:pPr/>
               <a:t>3</a:t>
@@ -7468,127 +8505,136 @@
       </p:sp>
       <p:sp>
         <p:nvSpPr>
-          <p:cNvPr id="195586" name="Rectangle 2"/>
+          <p:cNvPr id="36867" name="Rectangle 3"/>
           <p:cNvSpPr>
             <a:spLocks noGrp="1" noChangeArrowheads="1"/>
           </p:cNvSpPr>
           <p:nvPr>
-            <p:ph type="title"/>
+            <p:ph type="body" idx="1"/>
           </p:nvPr>
         </p:nvSpPr>
         <p:spPr>
           <a:xfrm>
-            <a:off x="1908175" y="346075"/>
-            <a:ext cx="6911975" cy="922338"/>
+            <a:off x="228600" y="3779838"/>
+            <a:ext cx="8207375" cy="3078162"/>
           </a:xfrm>
         </p:spPr>
         <p:txBody>
           <a:bodyPr/>
           <a:lstStyle/>
           <a:p>
-            <a:r>
-              <a:rPr lang="en-US" altLang="en-US" dirty="0" smtClean="0"/>
-              <a:t>Basic Operations</a:t>
-            </a:r>
-            <a:endParaRPr lang="en-US" altLang="en-US" dirty="0"/>
-          </a:p>
-        </p:txBody>
-      </p:sp>
-      <p:sp>
-        <p:nvSpPr>
-          <p:cNvPr id="195587" name="Rectangle 3"/>
-          <p:cNvSpPr>
-            <a:spLocks noGrp="1" noChangeArrowheads="1"/>
-          </p:cNvSpPr>
-          <p:nvPr>
-            <p:ph type="body" idx="1"/>
-          </p:nvPr>
-        </p:nvSpPr>
+            <a:pPr>
+              <a:lnSpc>
+                <a:spcPct val="80000"/>
+              </a:lnSpc>
+            </a:pPr>
+            <a:r>
+              <a:rPr lang="en-US" sz="3200" dirty="0" smtClean="0"/>
+              <a:t>The </a:t>
+            </a:r>
+            <a:r>
+              <a:rPr lang="en-US" sz="3200" dirty="0"/>
+              <a:t>tree maintain all keys at same level.</a:t>
+            </a:r>
+          </a:p>
+          <a:p>
+            <a:pPr>
+              <a:lnSpc>
+                <a:spcPct val="80000"/>
+              </a:lnSpc>
+            </a:pPr>
+            <a:r>
+              <a:rPr lang="en-US" sz="3200" dirty="0" smtClean="0"/>
+              <a:t>Each </a:t>
+            </a:r>
+            <a:r>
+              <a:rPr lang="en-US" sz="3200" dirty="0" smtClean="0"/>
+              <a:t>non root </a:t>
+            </a:r>
+            <a:r>
+              <a:rPr lang="en-US" sz="3200" dirty="0"/>
+              <a:t>and each </a:t>
+            </a:r>
+            <a:r>
+              <a:rPr lang="en-US" sz="3200" dirty="0" smtClean="0"/>
+              <a:t>non leaf </a:t>
+            </a:r>
+            <a:r>
+              <a:rPr lang="en-US" sz="3200" dirty="0"/>
+              <a:t>node have at least </a:t>
+            </a:r>
+            <a:r>
+              <a:rPr lang="en-US" sz="3200" dirty="0" smtClean="0"/>
+              <a:t>n/2 </a:t>
+            </a:r>
+            <a:r>
+              <a:rPr lang="en-US" sz="3200" dirty="0"/>
+              <a:t>nonempty children.</a:t>
+            </a:r>
+          </a:p>
+          <a:p>
+            <a:pPr>
+              <a:lnSpc>
+                <a:spcPct val="80000"/>
+              </a:lnSpc>
+            </a:pPr>
+            <a:r>
+              <a:rPr lang="en-US" sz="3200" dirty="0" smtClean="0"/>
+              <a:t>A </a:t>
+            </a:r>
+            <a:r>
+              <a:rPr lang="en-US" sz="3200" dirty="0"/>
+              <a:t>non root node has between n-1 and 2n-1 nodes.</a:t>
+            </a:r>
+          </a:p>
+          <a:p>
+            <a:pPr>
+              <a:lnSpc>
+                <a:spcPct val="80000"/>
+              </a:lnSpc>
+            </a:pPr>
+            <a:r>
+              <a:rPr lang="en-US" sz="3200" dirty="0" smtClean="0"/>
+              <a:t> </a:t>
+            </a:r>
+            <a:r>
+              <a:rPr lang="en-US" sz="3200" dirty="0"/>
+              <a:t>All the keys in the node is sorted.</a:t>
+            </a:r>
+            <a:endParaRPr lang="uk-UA" altLang="en-US" sz="3200" dirty="0"/>
+          </a:p>
+        </p:txBody>
+      </p:sp>
+      <p:pic>
+        <p:nvPicPr>
+          <p:cNvPr id="2" name="Picture 1"/>
+          <p:cNvPicPr>
+            <a:picLocks noChangeAspect="1"/>
+          </p:cNvPicPr>
+          <p:nvPr/>
+        </p:nvPicPr>
+        <p:blipFill>
+          <a:blip r:embed="rId2">
+            <a:extLst>
+              <a:ext uri="{28A0092B-C50C-407E-A947-70E740481C1C}">
+                <a14:useLocalDpi xmlns:a14="http://schemas.microsoft.com/office/drawing/2010/main" val="0"/>
+              </a:ext>
+            </a:extLst>
+          </a:blip>
+          <a:stretch>
+            <a:fillRect/>
+          </a:stretch>
+        </p:blipFill>
         <p:spPr>
           <a:xfrm>
-            <a:off x="1908175" y="1341438"/>
-            <a:ext cx="6911975" cy="5183187"/>
+            <a:off x="1093787" y="609600"/>
+            <a:ext cx="6477000" cy="2638425"/>
           </a:xfrm>
+          <a:prstGeom prst="rect">
+            <a:avLst/>
+          </a:prstGeom>
         </p:spPr>
-        <p:txBody>
-          <a:bodyPr/>
-          <a:lstStyle/>
-          <a:p>
-            <a:pPr marL="0" indent="0">
-              <a:buNone/>
-            </a:pPr>
-            <a:r>
-              <a:rPr lang="en-US" altLang="en-US" dirty="0" smtClean="0"/>
-              <a:t>SEARCHING</a:t>
-            </a:r>
-          </a:p>
-          <a:p>
-            <a:r>
-              <a:rPr lang="en-US" altLang="en-US" dirty="0" smtClean="0"/>
-              <a:t>    In B tree we start to search from root node and compare the value.</a:t>
-            </a:r>
-          </a:p>
-          <a:p>
-            <a:r>
-              <a:rPr lang="en-US" altLang="en-US" dirty="0" smtClean="0"/>
-              <a:t> Determine which pointer to follow based on the value of key and the value of node. </a:t>
-            </a:r>
-          </a:p>
-          <a:p>
-            <a:r>
-              <a:rPr lang="en-US" altLang="en-US" dirty="0" smtClean="0"/>
-              <a:t>Follow the appropriate pointer until it finds the node or it reaches the child node.</a:t>
-            </a:r>
-          </a:p>
-          <a:p>
-            <a:pPr marL="0" indent="0">
-              <a:buNone/>
-            </a:pPr>
-            <a:endParaRPr lang="en-US" altLang="en-US" dirty="0" smtClean="0"/>
-          </a:p>
-          <a:p>
-            <a:pPr marL="0" indent="0">
-              <a:buNone/>
-            </a:pPr>
-            <a:r>
-              <a:rPr lang="en-US" altLang="en-US" dirty="0" smtClean="0"/>
-              <a:t>INSERTION</a:t>
-            </a:r>
-          </a:p>
-          <a:p>
-            <a:r>
-              <a:rPr lang="en-US" altLang="en-US" dirty="0" smtClean="0"/>
-              <a:t>While inserting the value in the node we search for the position and insert the value.</a:t>
-            </a:r>
-          </a:p>
-          <a:p>
-            <a:r>
-              <a:rPr lang="en-US" altLang="en-US" dirty="0" smtClean="0"/>
-              <a:t>If value is already present process stops.</a:t>
-            </a:r>
-          </a:p>
-          <a:p>
-            <a:r>
-              <a:rPr lang="en-US" altLang="en-US" dirty="0" smtClean="0"/>
-              <a:t>If the node is already full we split the node in two halves</a:t>
-            </a:r>
-            <a:r>
-              <a:rPr lang="en-US" altLang="en-US" dirty="0"/>
-              <a:t> </a:t>
-            </a:r>
-            <a:r>
-              <a:rPr lang="en-US" altLang="en-US" dirty="0" smtClean="0"/>
-              <a:t>and the middle value moves to the root node.</a:t>
-            </a:r>
-          </a:p>
-          <a:p>
-            <a:r>
-              <a:rPr lang="en-US" altLang="en-US" dirty="0" smtClean="0"/>
-              <a:t>If the root node is also full it also split into two halves and the middle key is the root node.</a:t>
-            </a:r>
-          </a:p>
-        </p:txBody>
-      </p:sp>
+      </p:pic>
     </p:spTree>
   </p:cSld>
   <p:clrMapOvr>
@@ -7623,79 +8669,21 @@
       </p:grpSpPr>
       <p:sp>
         <p:nvSpPr>
-          <p:cNvPr id="3" name="Content Placeholder 2"/>
-          <p:cNvSpPr>
-            <a:spLocks noGrp="1"/>
-          </p:cNvSpPr>
-          <p:nvPr>
-            <p:ph idx="1"/>
-          </p:nvPr>
-        </p:nvSpPr>
-        <p:spPr>
-          <a:xfrm>
-            <a:off x="1752600" y="381000"/>
-            <a:ext cx="6778625" cy="4525963"/>
-          </a:xfrm>
-        </p:spPr>
+          <p:cNvPr id="6" name="Slide Number Placeholder 5"/>
+          <p:cNvSpPr>
+            <a:spLocks noGrp="1"/>
+          </p:cNvSpPr>
+          <p:nvPr>
+            <p:ph type="sldNum" sz="quarter" idx="12"/>
+          </p:nvPr>
+        </p:nvSpPr>
+        <p:spPr/>
         <p:txBody>
           <a:bodyPr/>
           <a:lstStyle/>
           <a:p>
-            <a:pPr marL="0" indent="0">
-              <a:buNone/>
-            </a:pPr>
-            <a:r>
-              <a:rPr lang="en-US" dirty="0" smtClean="0"/>
-              <a:t>DELETION</a:t>
-            </a:r>
-          </a:p>
-          <a:p>
-            <a:r>
-              <a:rPr lang="en-US" dirty="0" smtClean="0"/>
-              <a:t>In this process we search for the value to be deleted.</a:t>
-            </a:r>
-          </a:p>
-          <a:p>
-            <a:pPr marL="0" indent="0">
-              <a:buNone/>
-            </a:pPr>
-            <a:r>
-              <a:rPr lang="en-US" dirty="0"/>
-              <a:t> </a:t>
-            </a:r>
-            <a:r>
-              <a:rPr lang="en-US" dirty="0" smtClean="0"/>
-              <a:t>          if value is not present process ends</a:t>
-            </a:r>
-          </a:p>
-          <a:p>
-            <a:r>
-              <a:rPr lang="en-US" dirty="0" smtClean="0"/>
-              <a:t>If value is found , we delete it and move the  next value to its place.</a:t>
-            </a:r>
-          </a:p>
-          <a:p>
-            <a:endParaRPr lang="en-US" dirty="0"/>
-          </a:p>
-        </p:txBody>
-      </p:sp>
-      <p:sp>
-        <p:nvSpPr>
-          <p:cNvPr id="4" name="Slide Number Placeholder 3"/>
-          <p:cNvSpPr>
-            <a:spLocks noGrp="1"/>
-          </p:cNvSpPr>
-          <p:nvPr>
-            <p:ph type="sldNum" sz="quarter" idx="12"/>
-          </p:nvPr>
-        </p:nvSpPr>
-        <p:spPr/>
-        <p:txBody>
-          <a:bodyPr/>
-          <a:lstStyle/>
-          <a:p>
-            <a:fld id="{206013A2-8E8D-4494-A60E-FB3AB0008562}" type="slidenum">
-              <a:rPr lang="ru-RU" altLang="en-US" smtClean="0"/>
+            <a:fld id="{E559C099-5EB3-45CB-8F43-155CF13A2BDD}" type="slidenum">
+              <a:rPr lang="ru-RU" altLang="en-US"/>
               <a:pPr/>
               <a:t>4</a:t>
             </a:fld>
@@ -7703,12 +8691,89 @@
           </a:p>
         </p:txBody>
       </p:sp>
+      <p:sp>
+        <p:nvSpPr>
+          <p:cNvPr id="195586" name="Rectangle 2"/>
+          <p:cNvSpPr>
+            <a:spLocks noGrp="1" noChangeArrowheads="1"/>
+          </p:cNvSpPr>
+          <p:nvPr>
+            <p:ph type="title"/>
+          </p:nvPr>
+        </p:nvSpPr>
+        <p:spPr>
+          <a:xfrm>
+            <a:off x="1908175" y="346075"/>
+            <a:ext cx="6911975" cy="922338"/>
+          </a:xfrm>
+        </p:spPr>
+        <p:txBody>
+          <a:bodyPr/>
+          <a:lstStyle/>
+          <a:p>
+            <a:r>
+              <a:rPr lang="en-US" altLang="en-US" dirty="0" smtClean="0"/>
+              <a:t>Basic Operations</a:t>
+            </a:r>
+            <a:endParaRPr lang="en-US" altLang="en-US" dirty="0"/>
+          </a:p>
+        </p:txBody>
+      </p:sp>
+      <p:sp>
+        <p:nvSpPr>
+          <p:cNvPr id="195587" name="Rectangle 3"/>
+          <p:cNvSpPr>
+            <a:spLocks noGrp="1" noChangeArrowheads="1"/>
+          </p:cNvSpPr>
+          <p:nvPr>
+            <p:ph type="body" idx="1"/>
+          </p:nvPr>
+        </p:nvSpPr>
+        <p:spPr>
+          <a:xfrm>
+            <a:off x="1908175" y="1341438"/>
+            <a:ext cx="6911975" cy="5183187"/>
+          </a:xfrm>
+        </p:spPr>
+        <p:txBody>
+          <a:bodyPr/>
+          <a:lstStyle/>
+          <a:p>
+            <a:pPr marL="0" indent="0">
+              <a:buNone/>
+            </a:pPr>
+            <a:r>
+              <a:rPr lang="en-US" altLang="en-US" dirty="0" smtClean="0"/>
+              <a:t>SEARCHING</a:t>
+            </a:r>
+          </a:p>
+          <a:p>
+            <a:r>
+              <a:rPr lang="en-US" altLang="en-US" dirty="0" smtClean="0"/>
+              <a:t>    In B tree we start to search from root node and compare the value.</a:t>
+            </a:r>
+          </a:p>
+          <a:p>
+            <a:r>
+              <a:rPr lang="en-US" altLang="en-US" dirty="0" smtClean="0"/>
+              <a:t> Determine which pointer to follow based on the value of key and the value of node. </a:t>
+            </a:r>
+          </a:p>
+          <a:p>
+            <a:r>
+              <a:rPr lang="en-US" altLang="en-US" dirty="0" smtClean="0"/>
+              <a:t>Follow the appropriate pointer until it finds the node or it reaches the child node.</a:t>
+            </a:r>
+          </a:p>
+          <a:p>
+            <a:pPr marL="0" indent="0">
+              <a:buNone/>
+            </a:pPr>
+            <a:endParaRPr lang="en-US" altLang="en-US" dirty="0" smtClean="0"/>
+          </a:p>
+        </p:txBody>
+      </p:sp>
     </p:spTree>
-    <p:extLst>
-      <p:ext uri="{BB962C8B-B14F-4D97-AF65-F5344CB8AC3E}">
-        <p14:creationId xmlns:p14="http://schemas.microsoft.com/office/powerpoint/2010/main" val="3279618454"/>
-      </p:ext>
-    </p:extLst>
   </p:cSld>
   <p:clrMapOvr>
     <a:masterClrMapping/>
@@ -7752,6 +8817,232 @@
         </p:nvSpPr>
         <p:spPr>
           <a:xfrm>
+            <a:off x="1752600" y="1"/>
+            <a:ext cx="6778625" cy="3048000"/>
+          </a:xfrm>
+        </p:spPr>
+        <p:txBody>
+          <a:bodyPr/>
+          <a:lstStyle/>
+          <a:p>
+            <a:pPr marL="0" indent="0">
+              <a:buNone/>
+            </a:pPr>
+            <a:r>
+              <a:rPr lang="en-US" altLang="en-US" dirty="0"/>
+              <a:t>INSERTION</a:t>
+            </a:r>
+          </a:p>
+          <a:p>
+            <a:r>
+              <a:rPr lang="en-US" altLang="en-US" dirty="0"/>
+              <a:t>While inserting the value in the node we search for the position and insert the value.</a:t>
+            </a:r>
+          </a:p>
+          <a:p>
+            <a:r>
+              <a:rPr lang="en-US" altLang="en-US" dirty="0"/>
+              <a:t>If value is already present process stops.</a:t>
+            </a:r>
+          </a:p>
+          <a:p>
+            <a:r>
+              <a:rPr lang="en-US" altLang="en-US" dirty="0"/>
+              <a:t>If the node is already full we split the node in two halves and the middle value moves to the root node.</a:t>
+            </a:r>
+          </a:p>
+          <a:p>
+            <a:r>
+              <a:rPr lang="en-US" altLang="en-US" dirty="0"/>
+              <a:t>If the root node is also full it also split into two halves and the middle key is the root node.</a:t>
+            </a:r>
+          </a:p>
+          <a:p>
+            <a:endParaRPr lang="en-US" dirty="0"/>
+          </a:p>
+        </p:txBody>
+      </p:sp>
+      <p:sp>
+        <p:nvSpPr>
+          <p:cNvPr id="4" name="Slide Number Placeholder 3"/>
+          <p:cNvSpPr>
+            <a:spLocks noGrp="1"/>
+          </p:cNvSpPr>
+          <p:nvPr>
+            <p:ph type="sldNum" sz="quarter" idx="12"/>
+          </p:nvPr>
+        </p:nvSpPr>
+        <p:spPr/>
+        <p:txBody>
+          <a:bodyPr/>
+          <a:lstStyle/>
+          <a:p>
+            <a:fld id="{206013A2-8E8D-4494-A60E-FB3AB0008562}" type="slidenum">
+              <a:rPr lang="ru-RU" altLang="en-US" smtClean="0"/>
+              <a:pPr/>
+              <a:t>5</a:t>
+            </a:fld>
+            <a:endParaRPr lang="ru-RU" altLang="en-US"/>
+          </a:p>
+        </p:txBody>
+      </p:sp>
+    </p:spTree>
+    <p:extLst>
+      <p:ext uri="{BB962C8B-B14F-4D97-AF65-F5344CB8AC3E}">
+        <p14:creationId xmlns:p14="http://schemas.microsoft.com/office/powerpoint/2010/main" val="3279618454"/>
+      </p:ext>
+    </p:extLst>
+  </p:cSld>
+  <p:clrMapOvr>
+    <a:masterClrMapping/>
+  </p:clrMapOvr>
+  <p:timing>
+    <p:tnLst>
+      <p:par>
+        <p:cTn id="1" dur="indefinite" restart="never" nodeType="tmRoot"/>
+      </p:par>
+    </p:tnLst>
+  </p:timing>
+</p:sld>
+</file>
+
+<file path=ppt/slides/slide6.xml><?xml version="1.0" encoding="utf-8"?>
+<p:sld xmlns:a="http://schemas.openxmlformats.org/drawingml/2006/main" xmlns:r="http://schemas.openxmlformats.org/officeDocument/2006/relationships" xmlns:p="http://schemas.openxmlformats.org/presentationml/2006/main">
+  <p:cSld>
+    <p:spTree>
+      <p:nvGrpSpPr>
+        <p:cNvPr id="1" name=""/>
+        <p:cNvGrpSpPr/>
+        <p:nvPr/>
+      </p:nvGrpSpPr>
+      <p:grpSpPr>
+        <a:xfrm>
+          <a:off x="0" y="0"/>
+          <a:ext cx="0" cy="0"/>
+          <a:chOff x="0" y="0"/>
+          <a:chExt cx="0" cy="0"/>
+        </a:xfrm>
+      </p:grpSpPr>
+      <p:sp>
+        <p:nvSpPr>
+          <p:cNvPr id="3" name="Content Placeholder 2"/>
+          <p:cNvSpPr>
+            <a:spLocks noGrp="1"/>
+          </p:cNvSpPr>
+          <p:nvPr>
+            <p:ph idx="1"/>
+          </p:nvPr>
+        </p:nvSpPr>
+        <p:spPr>
+          <a:xfrm>
+            <a:off x="1981200" y="381000"/>
+            <a:ext cx="6778625" cy="1981200"/>
+          </a:xfrm>
+        </p:spPr>
+        <p:txBody>
+          <a:bodyPr/>
+          <a:lstStyle/>
+          <a:p>
+            <a:pPr marL="0" indent="0">
+              <a:buNone/>
+            </a:pPr>
+            <a:r>
+              <a:rPr lang="en-US" dirty="0"/>
+              <a:t>DELETION</a:t>
+            </a:r>
+          </a:p>
+          <a:p>
+            <a:r>
+              <a:rPr lang="en-US" dirty="0"/>
+              <a:t>In this process we search for the value to be deleted.</a:t>
+            </a:r>
+          </a:p>
+          <a:p>
+            <a:pPr marL="0" indent="0">
+              <a:buNone/>
+            </a:pPr>
+            <a:r>
+              <a:rPr lang="en-US" dirty="0"/>
+              <a:t>           if value is not present process ends</a:t>
+            </a:r>
+          </a:p>
+          <a:p>
+            <a:r>
+              <a:rPr lang="en-US" dirty="0"/>
+              <a:t>If value is found , we delete it and move the  next value to its place.</a:t>
+            </a:r>
+          </a:p>
+          <a:p>
+            <a:endParaRPr lang="en-US" dirty="0"/>
+          </a:p>
+        </p:txBody>
+      </p:sp>
+      <p:sp>
+        <p:nvSpPr>
+          <p:cNvPr id="4" name="Slide Number Placeholder 3"/>
+          <p:cNvSpPr>
+            <a:spLocks noGrp="1"/>
+          </p:cNvSpPr>
+          <p:nvPr>
+            <p:ph type="sldNum" sz="quarter" idx="12"/>
+          </p:nvPr>
+        </p:nvSpPr>
+        <p:spPr/>
+        <p:txBody>
+          <a:bodyPr/>
+          <a:lstStyle/>
+          <a:p>
+            <a:fld id="{206013A2-8E8D-4494-A60E-FB3AB0008562}" type="slidenum">
+              <a:rPr lang="ru-RU" altLang="en-US" smtClean="0"/>
+              <a:pPr/>
+              <a:t>6</a:t>
+            </a:fld>
+            <a:endParaRPr lang="ru-RU" altLang="en-US"/>
+          </a:p>
+        </p:txBody>
+      </p:sp>
+    </p:spTree>
+    <p:extLst>
+      <p:ext uri="{BB962C8B-B14F-4D97-AF65-F5344CB8AC3E}">
+        <p14:creationId xmlns:p14="http://schemas.microsoft.com/office/powerpoint/2010/main" val="3755130868"/>
+      </p:ext>
+    </p:extLst>
+  </p:cSld>
+  <p:clrMapOvr>
+    <a:masterClrMapping/>
+  </p:clrMapOvr>
+</p:sld>
+</file>
+
+<file path=ppt/slides/slide7.xml><?xml version="1.0" encoding="utf-8"?>
+<p:sld xmlns:a="http://schemas.openxmlformats.org/drawingml/2006/main" xmlns:r="http://schemas.openxmlformats.org/officeDocument/2006/relationships" xmlns:p="http://schemas.openxmlformats.org/presentationml/2006/main">
+  <p:cSld>
+    <p:spTree>
+      <p:nvGrpSpPr>
+        <p:cNvPr id="1" name=""/>
+        <p:cNvGrpSpPr/>
+        <p:nvPr/>
+      </p:nvGrpSpPr>
+      <p:grpSpPr>
+        <a:xfrm>
+          <a:off x="0" y="0"/>
+          <a:ext cx="0" cy="0"/>
+          <a:chOff x="0" y="0"/>
+          <a:chExt cx="0" cy="0"/>
+        </a:xfrm>
+      </p:grpSpPr>
+      <p:sp>
+        <p:nvSpPr>
+          <p:cNvPr id="3" name="Content Placeholder 2"/>
+          <p:cNvSpPr>
+            <a:spLocks noGrp="1"/>
+          </p:cNvSpPr>
+          <p:nvPr>
+            <p:ph idx="1"/>
+          </p:nvPr>
+        </p:nvSpPr>
+        <p:spPr>
+          <a:xfrm>
             <a:off x="3733800" y="2667000"/>
             <a:ext cx="4572000" cy="4525963"/>
           </a:xfrm>
@@ -7789,7 +9080,7 @@
             <a:fld id="{206013A2-8E8D-4494-A60E-FB3AB0008562}" type="slidenum">
               <a:rPr lang="ru-RU" altLang="en-US" smtClean="0"/>
               <a:pPr/>
-              <a:t>5</a:t>
+              <a:t>7</a:t>
             </a:fld>
             <a:endParaRPr lang="ru-RU" altLang="en-US"/>
           </a:p>

</xml_diff>